<commit_message>
Update Physics 101 Lecture Materials: Revise notes and visuals for lectures 1 and 2 in multiple languages, including changes to JSON progress files and PowerPoint presentations. Replace placeholder images with reimagined visuals and enhance note translations for clarity and accuracy.
</commit_message>
<xml_diff>
--- a/backend/seeds/generate/Physics_101_Lecture_1_yue-HK_with_notes.pptx
+++ b/backend/seeds/generate/Physics_101_Lecture_1_yue-HK_with_notes.pptx
@@ -508,7 +508,7 @@
           <a:p>
             <a:pPr algn="l"/>
             <a:r>
-              <a:t>歡迎大家嚟到物理學101。今日我哋會講吓運動嘅基本定律。我哋會特別探討牛頓三大運動定律，同埋佢哋點樣支配我哋身邊嘅世界。</a:t>
+              <a:t>歡迎各位來到物理學一百零一。今天我們將會討論運動的基本定律。具體來說，我們將會探討牛頓三大運動定律，以及它們如何支配我們周圍的世界。</a:t>
             </a:r>
           </a:p>
         </p:txBody>
@@ -579,7 +579,15 @@
           <a:p>
             <a:pPr algn="l"/>
             <a:r>
-              <a:t>首先，我哋嚟定義「力」。力簡單嚟講，就係當一個物體同另一個物體相互作用時，對該物體產生嘅推或拉。每當兩個物體之間有相互作用，每個物體都會受到力。</a:t>
+              <a:t>首先，我哋定義「力」。</a:t>
+            </a:r>
+            <a:br/>
+            <a:r>
+              <a:t>「力」簡單嚟講就係一個物體同另一個物體互動時，對佢產生嘅推或拉。</a:t>
+            </a:r>
+            <a:br/>
+            <a:r>
+              <a:t>每當兩個物體之間有互動嘅時候，每個物體都會受到一個力。</a:t>
             </a:r>
           </a:p>
         </p:txBody>
@@ -650,7 +658,7 @@
           <a:p>
             <a:pPr algn="l"/>
             <a:r>
-              <a:t>牛頓第一定律，又稱慣性定律，指出一個靜止嘅物體會保持靜止，而一個運動中嘅物體會以相同嘅速度同相同嘅方向繼續運動，除非佢受到不平衡力嘅作用。</a:t>
+              <a:t>牛頓第一定律，亦稱為慣性定律，指出靜止嘅物體會保持靜止，而運動中嘅物體會保持運動，並以相同嘅速度同方向，除非受到不平衡力嘅作用。</a:t>
             </a:r>
           </a:p>
         </p:txBody>
@@ -721,7 +729,7 @@
           <a:p>
             <a:pPr algn="l"/>
             <a:r>
-              <a:t>牛頓第二定律提供咗計算力嘅方法。佢指出力等於質量乘以加速度。F 等於 m a。呢個意思係，一件物件越重，就需要越大嘅力去移動佢。</a:t>
+              <a:t>牛頓第二定律提供咗計算力嘅方法。佢指出力等於質量乘以加速度。即係 F 等於 m a。呢個意思係，一件物件越重，就需要越大嘅力去移動佢。</a:t>
             </a:r>
           </a:p>
         </p:txBody>
@@ -792,7 +800,7 @@
           <a:p>
             <a:pPr algn="l"/>
             <a:r>
-              <a:t>最後，牛頓第三定律：每個作用力都有一個大小相等、方向相反的反作用力。這表示在每次相互作用中，都有一個作用力對存在於兩個相互作用的物體上。</a:t>
+              <a:t>最後，牛頓第三定律：每個作用力都有一個大小相等、方向相反的反作用力。這意味著在每次相互作用中，都有一對力作用在兩個相互作用的物體上。</a:t>
             </a:r>
           </a:p>
         </p:txBody>
@@ -863,7 +871,7 @@
           <a:p>
             <a:pPr algn="l"/>
             <a:r>
-              <a:t>我哋嘅簡短介紹就到呢度。請大家溫習教科書嘅第一章，以備下星期嘅實驗堂。多謝大家！</a:t>
+              <a:t>我哋嘅簡短介紹就到此為止。請溫習你哋課本嘅第一章，為下星期嘅實驗課做準備。多謝各位聆聽！</a:t>
             </a:r>
           </a:p>
         </p:txBody>

</xml_diff>